<commit_message>
aggiunto diagramma uml e piccole modifiche layout
</commit_message>
<xml_diff>
--- a/CarFinder.pptx
+++ b/CarFinder.pptx
@@ -10,10 +10,9 @@
     <p:sldId id="258" r:id="rId4"/>
     <p:sldId id="259" r:id="rId5"/>
     <p:sldId id="265" r:id="rId6"/>
-    <p:sldId id="262" r:id="rId7"/>
-    <p:sldId id="266" r:id="rId8"/>
-    <p:sldId id="263" r:id="rId9"/>
-    <p:sldId id="264" r:id="rId10"/>
+    <p:sldId id="266" r:id="rId7"/>
+    <p:sldId id="263" r:id="rId8"/>
+    <p:sldId id="264" r:id="rId9"/>
   </p:sldIdLst>
   <p:sldSz cx="9144000" cy="6858000" type="screen4x3"/>
   <p:notesSz cx="6858000" cy="9144000"/>
@@ -289,7 +288,7 @@
             <a:fld id="{4B6055F8-1D02-4417-9241-55C834FD9970}" type="datetimeFigureOut">
               <a:rPr lang="it-IT" smtClean="0"/>
               <a:pPr/>
-              <a:t>17/06/2017</a:t>
+              <a:t>19/06/2017</a:t>
             </a:fld>
             <a:endParaRPr lang="it-IT"/>
           </a:p>
@@ -456,7 +455,7 @@
             <a:fld id="{4B6055F8-1D02-4417-9241-55C834FD9970}" type="datetimeFigureOut">
               <a:rPr lang="it-IT" smtClean="0"/>
               <a:pPr/>
-              <a:t>17/06/2017</a:t>
+              <a:t>19/06/2017</a:t>
             </a:fld>
             <a:endParaRPr lang="it-IT"/>
           </a:p>
@@ -633,7 +632,7 @@
             <a:fld id="{4B6055F8-1D02-4417-9241-55C834FD9970}" type="datetimeFigureOut">
               <a:rPr lang="it-IT" smtClean="0"/>
               <a:pPr/>
-              <a:t>17/06/2017</a:t>
+              <a:t>19/06/2017</a:t>
             </a:fld>
             <a:endParaRPr lang="it-IT"/>
           </a:p>
@@ -800,7 +799,7 @@
             <a:fld id="{4B6055F8-1D02-4417-9241-55C834FD9970}" type="datetimeFigureOut">
               <a:rPr lang="it-IT" smtClean="0"/>
               <a:pPr/>
-              <a:t>17/06/2017</a:t>
+              <a:t>19/06/2017</a:t>
             </a:fld>
             <a:endParaRPr lang="it-IT"/>
           </a:p>
@@ -1044,7 +1043,7 @@
             <a:fld id="{4B6055F8-1D02-4417-9241-55C834FD9970}" type="datetimeFigureOut">
               <a:rPr lang="it-IT" smtClean="0"/>
               <a:pPr/>
-              <a:t>17/06/2017</a:t>
+              <a:t>19/06/2017</a:t>
             </a:fld>
             <a:endParaRPr lang="it-IT"/>
           </a:p>
@@ -1310,7 +1309,7 @@
             <a:fld id="{4B6055F8-1D02-4417-9241-55C834FD9970}" type="datetimeFigureOut">
               <a:rPr lang="it-IT" smtClean="0"/>
               <a:pPr/>
-              <a:t>17/06/2017</a:t>
+              <a:t>19/06/2017</a:t>
             </a:fld>
             <a:endParaRPr lang="it-IT"/>
           </a:p>
@@ -1690,7 +1689,7 @@
             <a:fld id="{4B6055F8-1D02-4417-9241-55C834FD9970}" type="datetimeFigureOut">
               <a:rPr lang="it-IT" smtClean="0"/>
               <a:pPr/>
-              <a:t>17/06/2017</a:t>
+              <a:t>19/06/2017</a:t>
             </a:fld>
             <a:endParaRPr lang="it-IT"/>
           </a:p>
@@ -1842,7 +1841,7 @@
             <a:fld id="{4B6055F8-1D02-4417-9241-55C834FD9970}" type="datetimeFigureOut">
               <a:rPr lang="it-IT" smtClean="0"/>
               <a:pPr/>
-              <a:t>17/06/2017</a:t>
+              <a:t>19/06/2017</a:t>
             </a:fld>
             <a:endParaRPr lang="it-IT"/>
           </a:p>
@@ -1934,7 +1933,7 @@
             <a:fld id="{4B6055F8-1D02-4417-9241-55C834FD9970}" type="datetimeFigureOut">
               <a:rPr lang="it-IT" smtClean="0"/>
               <a:pPr/>
-              <a:t>17/06/2017</a:t>
+              <a:t>19/06/2017</a:t>
             </a:fld>
             <a:endParaRPr lang="it-IT"/>
           </a:p>
@@ -2197,7 +2196,7 @@
             <a:fld id="{4B6055F8-1D02-4417-9241-55C834FD9970}" type="datetimeFigureOut">
               <a:rPr lang="it-IT" smtClean="0"/>
               <a:pPr/>
-              <a:t>17/06/2017</a:t>
+              <a:t>19/06/2017</a:t>
             </a:fld>
             <a:endParaRPr lang="it-IT"/>
           </a:p>
@@ -2487,7 +2486,7 @@
             <a:fld id="{4B6055F8-1D02-4417-9241-55C834FD9970}" type="datetimeFigureOut">
               <a:rPr lang="it-IT" smtClean="0"/>
               <a:pPr/>
-              <a:t>17/06/2017</a:t>
+              <a:t>19/06/2017</a:t>
             </a:fld>
             <a:endParaRPr lang="it-IT"/>
           </a:p>
@@ -3260,7 +3259,7 @@
             <a:fld id="{4B6055F8-1D02-4417-9241-55C834FD9970}" type="datetimeFigureOut">
               <a:rPr lang="it-IT" smtClean="0"/>
               <a:pPr/>
-              <a:t>17/06/2017</a:t>
+              <a:t>19/06/2017</a:t>
             </a:fld>
             <a:endParaRPr lang="it-IT"/>
           </a:p>
@@ -4043,6 +4042,9 @@
               <a:t>L’applicazione aiuta l’utente tramite l’utilizzo di servizi come GPS e le mappe di Google a ritrovare l’auto parcheggiata. La posizione dell’auto è salvata in remoto tramite un database.</a:t>
             </a:r>
           </a:p>
+          <a:p>
+            <a:endParaRPr lang="it-IT" dirty="0" smtClean="0"/>
+          </a:p>
         </p:txBody>
       </p:sp>
     </p:spTree>
@@ -4144,7 +4146,6 @@
               <a:rPr lang="it-IT" sz="2000" dirty="0" smtClean="0"/>
               <a:t> Servizio di mappe offerto da Google</a:t>
             </a:r>
-            <a:endParaRPr lang="it-IT" sz="2000" dirty="0" smtClean="0"/>
           </a:p>
           <a:p>
             <a:r>
@@ -4242,7 +4243,7 @@
           <a:p>
             <a:r>
               <a:rPr lang="it-IT" sz="2000" dirty="0" smtClean="0"/>
-              <a:t>Che cos’è il GPS?</a:t>
+              <a:t>Cos’è  il GPS?</a:t>
             </a:r>
           </a:p>
           <a:p>
@@ -4381,6 +4382,50 @@
             </a:r>
           </a:p>
           <a:p>
+            <a:pPr lvl="2"/>
+            <a:r>
+              <a:rPr lang="it-IT" sz="1700" dirty="0" smtClean="0">
+                <a:solidFill>
+                  <a:schemeClr val="accent2"/>
+                </a:solidFill>
+              </a:rPr>
+              <a:t>Qual è la differenza tra un database ad </a:t>
+            </a:r>
+            <a:r>
+              <a:rPr lang="it-IT" sz="1700" u="sng" dirty="0" smtClean="0">
+                <a:solidFill>
+                  <a:schemeClr val="accent2"/>
+                </a:solidFill>
+              </a:rPr>
+              <a:t>Oggetti</a:t>
+            </a:r>
+            <a:r>
+              <a:rPr lang="it-IT" sz="1700" dirty="0" smtClean="0">
+                <a:solidFill>
+                  <a:schemeClr val="accent2"/>
+                </a:solidFill>
+              </a:rPr>
+              <a:t> e uno </a:t>
+            </a:r>
+            <a:r>
+              <a:rPr lang="it-IT" sz="1700" u="sng" dirty="0" smtClean="0">
+                <a:solidFill>
+                  <a:schemeClr val="accent2"/>
+                </a:solidFill>
+              </a:rPr>
+              <a:t>Relazionale</a:t>
+            </a:r>
+            <a:r>
+              <a:rPr lang="it-IT" sz="1700" dirty="0" smtClean="0">
+                <a:solidFill>
+                  <a:schemeClr val="accent2"/>
+                </a:solidFill>
+              </a:rPr>
+              <a:t> ?</a:t>
+            </a:r>
+            <a:endParaRPr lang="it-IT" sz="2000" dirty="0" smtClean="0"/>
+          </a:p>
+          <a:p>
             <a:pPr lvl="1"/>
             <a:r>
               <a:rPr lang="it-IT" sz="2000" dirty="0" smtClean="0"/>
@@ -4442,166 +4487,6 @@
 </file>
 
 <file path=ppt/slides/slide6.xml><?xml version="1.0" encoding="utf-8"?>
-<p:sld xmlns:a="http://schemas.openxmlformats.org/drawingml/2006/main" xmlns:r="http://schemas.openxmlformats.org/officeDocument/2006/relationships" xmlns:p="http://schemas.openxmlformats.org/presentationml/2006/main">
-  <p:cSld>
-    <p:spTree>
-      <p:nvGrpSpPr>
-        <p:cNvPr id="1" name=""/>
-        <p:cNvGrpSpPr/>
-        <p:nvPr/>
-      </p:nvGrpSpPr>
-      <p:grpSpPr>
-        <a:xfrm>
-          <a:off x="0" y="0"/>
-          <a:ext cx="0" cy="0"/>
-          <a:chOff x="0" y="0"/>
-          <a:chExt cx="0" cy="0"/>
-        </a:xfrm>
-      </p:grpSpPr>
-      <p:sp>
-        <p:nvSpPr>
-          <p:cNvPr id="2" name="Titolo 1"/>
-          <p:cNvSpPr>
-            <a:spLocks noGrp="1"/>
-          </p:cNvSpPr>
-          <p:nvPr>
-            <p:ph type="title"/>
-          </p:nvPr>
-        </p:nvSpPr>
-        <p:spPr/>
-        <p:txBody>
-          <a:bodyPr/>
-          <a:lstStyle/>
-          <a:p>
-            <a:r>
-              <a:rPr lang="it-IT" dirty="0" err="1" smtClean="0"/>
-              <a:t>Firebase</a:t>
-            </a:r>
-            <a:r>
-              <a:rPr lang="it-IT" dirty="0" smtClean="0"/>
-              <a:t> Database</a:t>
-            </a:r>
-            <a:endParaRPr lang="it-IT" dirty="0"/>
-          </a:p>
-        </p:txBody>
-      </p:sp>
-      <p:sp>
-        <p:nvSpPr>
-          <p:cNvPr id="3" name="Segnaposto contenuto 2"/>
-          <p:cNvSpPr>
-            <a:spLocks noGrp="1"/>
-          </p:cNvSpPr>
-          <p:nvPr>
-            <p:ph idx="1"/>
-          </p:nvPr>
-        </p:nvSpPr>
-        <p:spPr>
-          <a:xfrm>
-            <a:off x="428596" y="2468880"/>
-            <a:ext cx="8229600" cy="4389120"/>
-          </a:xfrm>
-        </p:spPr>
-        <p:txBody>
-          <a:bodyPr/>
-          <a:lstStyle/>
-          <a:p>
-            <a:r>
-              <a:rPr lang="it-IT" dirty="0" err="1" smtClean="0"/>
-              <a:t>Firebase</a:t>
-            </a:r>
-            <a:r>
-              <a:rPr lang="it-IT" dirty="0" smtClean="0"/>
-              <a:t> offre un </a:t>
-            </a:r>
-            <a:r>
-              <a:rPr lang="it-IT" dirty="0" err="1" smtClean="0"/>
-              <a:t>Object</a:t>
-            </a:r>
-            <a:r>
-              <a:rPr lang="it-IT" dirty="0" smtClean="0"/>
-              <a:t> </a:t>
-            </a:r>
-            <a:r>
-              <a:rPr lang="it-IT" dirty="0" err="1" smtClean="0"/>
-              <a:t>Oriented</a:t>
-            </a:r>
-            <a:r>
-              <a:rPr lang="it-IT" dirty="0" smtClean="0"/>
-              <a:t> Database ovvero un database ad oggetti.</a:t>
-            </a:r>
-          </a:p>
-          <a:p>
-            <a:pPr lvl="1"/>
-            <a:r>
-              <a:rPr lang="it-IT" sz="2000" dirty="0" smtClean="0">
-                <a:solidFill>
-                  <a:schemeClr val="accent2"/>
-                </a:solidFill>
-              </a:rPr>
-              <a:t>Qual è la differenza tra un database ad </a:t>
-            </a:r>
-            <a:r>
-              <a:rPr lang="it-IT" sz="2000" u="sng" dirty="0" smtClean="0">
-                <a:solidFill>
-                  <a:schemeClr val="accent2"/>
-                </a:solidFill>
-              </a:rPr>
-              <a:t>Oggetti</a:t>
-            </a:r>
-            <a:r>
-              <a:rPr lang="it-IT" sz="2000" dirty="0" smtClean="0">
-                <a:solidFill>
-                  <a:schemeClr val="accent2"/>
-                </a:solidFill>
-              </a:rPr>
-              <a:t> e uno </a:t>
-            </a:r>
-            <a:r>
-              <a:rPr lang="it-IT" sz="2000" u="sng" dirty="0" smtClean="0">
-                <a:solidFill>
-                  <a:schemeClr val="accent2"/>
-                </a:solidFill>
-              </a:rPr>
-              <a:t>Relazionale</a:t>
-            </a:r>
-            <a:r>
-              <a:rPr lang="it-IT" sz="2000" dirty="0" smtClean="0">
-                <a:solidFill>
-                  <a:schemeClr val="accent2"/>
-                </a:solidFill>
-              </a:rPr>
-              <a:t> ?</a:t>
-            </a:r>
-          </a:p>
-          <a:p>
-            <a:r>
-              <a:rPr lang="it-IT" dirty="0" smtClean="0"/>
-              <a:t>Database </a:t>
-            </a:r>
-            <a:r>
-              <a:rPr lang="it-IT" dirty="0" err="1" smtClean="0"/>
-              <a:t>Realtime</a:t>
-            </a:r>
-            <a:endParaRPr lang="it-IT" dirty="0"/>
-          </a:p>
-        </p:txBody>
-      </p:sp>
-    </p:spTree>
-  </p:cSld>
-  <p:clrMapOvr>
-    <a:masterClrMapping/>
-  </p:clrMapOvr>
-  <p:timing>
-    <p:tnLst>
-      <p:par>
-        <p:cTn id="1" dur="indefinite" restart="never" nodeType="tmRoot"/>
-      </p:par>
-    </p:tnLst>
-  </p:timing>
-</p:sld>
-</file>
-
-<file path=ppt/slides/slide7.xml><?xml version="1.0" encoding="utf-8"?>
 <p:sld xmlns:a="http://schemas.openxmlformats.org/drawingml/2006/main" xmlns:r="http://schemas.openxmlformats.org/officeDocument/2006/relationships" xmlns:p="http://schemas.openxmlformats.org/presentationml/2006/main">
   <p:cSld>
     <p:spTree>
@@ -4839,7 +4724,7 @@
 </p:sld>
 </file>
 
-<file path=ppt/slides/slide8.xml><?xml version="1.0" encoding="utf-8"?>
+<file path=ppt/slides/slide7.xml><?xml version="1.0" encoding="utf-8"?>
 <p:sld xmlns:a="http://schemas.openxmlformats.org/drawingml/2006/main" xmlns:r="http://schemas.openxmlformats.org/officeDocument/2006/relationships" xmlns:p="http://schemas.openxmlformats.org/presentationml/2006/main">
   <p:cSld>
     <p:spTree>
@@ -5056,7 +4941,7 @@
 </p:sld>
 </file>
 
-<file path=ppt/slides/slide9.xml><?xml version="1.0" encoding="utf-8"?>
+<file path=ppt/slides/slide8.xml><?xml version="1.0" encoding="utf-8"?>
 <p:sld xmlns:a="http://schemas.openxmlformats.org/drawingml/2006/main" xmlns:r="http://schemas.openxmlformats.org/officeDocument/2006/relationships" xmlns:p="http://schemas.openxmlformats.org/presentationml/2006/main">
   <p:cSld>
     <p:spTree>
@@ -5119,11 +5004,7 @@
           <a:p>
             <a:r>
               <a:rPr lang="it-IT" dirty="0" smtClean="0"/>
-              <a:t>Utilizzo del servizio </a:t>
-            </a:r>
-            <a:r>
-              <a:rPr lang="it-IT" dirty="0" smtClean="0"/>
-              <a:t>GPS in </a:t>
+              <a:t>Utilizzo del servizio GPS in </a:t>
             </a:r>
             <a:r>
               <a:rPr lang="it-IT" dirty="0" err="1" smtClean="0"/>
@@ -5139,6 +5020,14 @@
             <a:r>
               <a:rPr lang="it-IT" dirty="0" err="1" smtClean="0"/>
               <a:t>Apis</a:t>
+            </a:r>
+            <a:r>
+              <a:rPr lang="it-IT" dirty="0" smtClean="0"/>
+              <a:t> e </a:t>
+            </a:r>
+            <a:r>
+              <a:rPr lang="it-IT" smtClean="0"/>
+              <a:t>Firebase</a:t>
             </a:r>
             <a:endParaRPr lang="it-IT" dirty="0"/>
           </a:p>
@@ -5160,7 +5049,7 @@
 </file>
 
 <file path=ppt/theme/theme1.xml><?xml version="1.0" encoding="utf-8"?>
-<a:theme xmlns:a="http://schemas.openxmlformats.org/drawingml/2006/main" name="Equinozio">
+<a:theme xmlns:a="http://schemas.openxmlformats.org/drawingml/2006/main" name="CarFinder">
   <a:themeElements>
     <a:clrScheme name="Equinozio">
       <a:dk1>

</xml_diff>